<commit_message>
Lock mods. First iteration.
</commit_message>
<xml_diff>
--- a/pix/bootstrap/icons.pptx
+++ b/pix/bootstrap/icons.pptx
@@ -3833,6 +3833,283 @@
           </a:p>
         </p:txBody>
       </p:sp>
+      <p:sp>
+        <p:nvSpPr>
+          <p:cNvPr id="19" name="Forma libre: forma 18">
+            <a:extLst>
+              <a:ext uri="{FF2B5EF4-FFF2-40B4-BE49-F238E27FC236}">
+                <a16:creationId xmlns:a16="http://schemas.microsoft.com/office/drawing/2014/main" id="{09F1E0F5-C784-7237-0293-9005A30F03E5}"/>
+              </a:ext>
+            </a:extLst>
+          </p:cNvPr>
+          <p:cNvSpPr/>
+          <p:nvPr/>
+        </p:nvSpPr>
+        <p:spPr>
+          <a:xfrm>
+            <a:off x="1189768" y="3962958"/>
+            <a:ext cx="2516992" cy="2516992"/>
+          </a:xfrm>
+          <a:custGeom>
+            <a:avLst/>
+            <a:gdLst>
+              <a:gd name="connsiteX0" fmla="*/ 1258495 w 2516992"/>
+              <a:gd name="connsiteY0" fmla="*/ 209956 h 2516992"/>
+              <a:gd name="connsiteX1" fmla="*/ 237468 w 2516992"/>
+              <a:gd name="connsiteY1" fmla="*/ 1258495 h 2516992"/>
+              <a:gd name="connsiteX2" fmla="*/ 1258495 w 2516992"/>
+              <a:gd name="connsiteY2" fmla="*/ 2307034 h 2516992"/>
+              <a:gd name="connsiteX3" fmla="*/ 2279522 w 2516992"/>
+              <a:gd name="connsiteY3" fmla="*/ 1258495 h 2516992"/>
+              <a:gd name="connsiteX4" fmla="*/ 1258495 w 2516992"/>
+              <a:gd name="connsiteY4" fmla="*/ 209956 h 2516992"/>
+              <a:gd name="connsiteX5" fmla="*/ 1258496 w 2516992"/>
+              <a:gd name="connsiteY5" fmla="*/ 0 h 2516992"/>
+              <a:gd name="connsiteX6" fmla="*/ 2516992 w 2516992"/>
+              <a:gd name="connsiteY6" fmla="*/ 1258496 h 2516992"/>
+              <a:gd name="connsiteX7" fmla="*/ 1258496 w 2516992"/>
+              <a:gd name="connsiteY7" fmla="*/ 2516992 h 2516992"/>
+              <a:gd name="connsiteX8" fmla="*/ 0 w 2516992"/>
+              <a:gd name="connsiteY8" fmla="*/ 1258496 h 2516992"/>
+              <a:gd name="connsiteX9" fmla="*/ 1258496 w 2516992"/>
+              <a:gd name="connsiteY9" fmla="*/ 0 h 2516992"/>
+            </a:gdLst>
+            <a:ahLst/>
+            <a:cxnLst>
+              <a:cxn ang="0">
+                <a:pos x="connsiteX0" y="connsiteY0"/>
+              </a:cxn>
+              <a:cxn ang="0">
+                <a:pos x="connsiteX1" y="connsiteY1"/>
+              </a:cxn>
+              <a:cxn ang="0">
+                <a:pos x="connsiteX2" y="connsiteY2"/>
+              </a:cxn>
+              <a:cxn ang="0">
+                <a:pos x="connsiteX3" y="connsiteY3"/>
+              </a:cxn>
+              <a:cxn ang="0">
+                <a:pos x="connsiteX4" y="connsiteY4"/>
+              </a:cxn>
+              <a:cxn ang="0">
+                <a:pos x="connsiteX5" y="connsiteY5"/>
+              </a:cxn>
+              <a:cxn ang="0">
+                <a:pos x="connsiteX6" y="connsiteY6"/>
+              </a:cxn>
+              <a:cxn ang="0">
+                <a:pos x="connsiteX7" y="connsiteY7"/>
+              </a:cxn>
+              <a:cxn ang="0">
+                <a:pos x="connsiteX8" y="connsiteY8"/>
+              </a:cxn>
+              <a:cxn ang="0">
+                <a:pos x="connsiteX9" y="connsiteY9"/>
+              </a:cxn>
+            </a:cxnLst>
+            <a:rect l="l" t="t" r="r" b="b"/>
+            <a:pathLst>
+              <a:path w="2516992" h="2516992">
+                <a:moveTo>
+                  <a:pt x="1258495" y="209956"/>
+                </a:moveTo>
+                <a:cubicBezTo>
+                  <a:pt x="694597" y="209956"/>
+                  <a:pt x="237468" y="679403"/>
+                  <a:pt x="237468" y="1258495"/>
+                </a:cubicBezTo>
+                <a:cubicBezTo>
+                  <a:pt x="237468" y="1837587"/>
+                  <a:pt x="694597" y="2307034"/>
+                  <a:pt x="1258495" y="2307034"/>
+                </a:cubicBezTo>
+                <a:cubicBezTo>
+                  <a:pt x="1822393" y="2307034"/>
+                  <a:pt x="2279522" y="1837587"/>
+                  <a:pt x="2279522" y="1258495"/>
+                </a:cubicBezTo>
+                <a:cubicBezTo>
+                  <a:pt x="2279522" y="679403"/>
+                  <a:pt x="1822393" y="209956"/>
+                  <a:pt x="1258495" y="209956"/>
+                </a:cubicBezTo>
+                <a:close/>
+                <a:moveTo>
+                  <a:pt x="1258496" y="0"/>
+                </a:moveTo>
+                <a:cubicBezTo>
+                  <a:pt x="1953544" y="0"/>
+                  <a:pt x="2516992" y="563448"/>
+                  <a:pt x="2516992" y="1258496"/>
+                </a:cubicBezTo>
+                <a:cubicBezTo>
+                  <a:pt x="2516992" y="1953544"/>
+                  <a:pt x="1953544" y="2516992"/>
+                  <a:pt x="1258496" y="2516992"/>
+                </a:cubicBezTo>
+                <a:cubicBezTo>
+                  <a:pt x="563448" y="2516992"/>
+                  <a:pt x="0" y="1953544"/>
+                  <a:pt x="0" y="1258496"/>
+                </a:cubicBezTo>
+                <a:cubicBezTo>
+                  <a:pt x="0" y="563448"/>
+                  <a:pt x="563448" y="0"/>
+                  <a:pt x="1258496" y="0"/>
+                </a:cubicBezTo>
+                <a:close/>
+              </a:path>
+            </a:pathLst>
+          </a:custGeom>
+          <a:ln w="101600">
+            <a:solidFill>
+              <a:schemeClr val="bg1"/>
+            </a:solidFill>
+          </a:ln>
+        </p:spPr>
+        <p:style>
+          <a:lnRef idx="2">
+            <a:schemeClr val="accent1">
+              <a:shade val="15000"/>
+            </a:schemeClr>
+          </a:lnRef>
+          <a:fillRef idx="1">
+            <a:schemeClr val="accent1"/>
+          </a:fillRef>
+          <a:effectRef idx="0">
+            <a:schemeClr val="accent1"/>
+          </a:effectRef>
+          <a:fontRef idx="minor">
+            <a:schemeClr val="lt1"/>
+          </a:fontRef>
+        </p:style>
+        <p:txBody>
+          <a:bodyPr wrap="square" rtlCol="0" anchor="ctr">
+            <a:noAutofit/>
+          </a:bodyPr>
+          <a:lstStyle/>
+          <a:p>
+            <a:pPr algn="ctr"/>
+            <a:endParaRPr lang="es-ES"/>
+          </a:p>
+        </p:txBody>
+      </p:sp>
+      <p:sp>
+        <p:nvSpPr>
+          <p:cNvPr id="20" name="Forma libre: forma 19">
+            <a:extLst>
+              <a:ext uri="{FF2B5EF4-FFF2-40B4-BE49-F238E27FC236}">
+                <a16:creationId xmlns:a16="http://schemas.microsoft.com/office/drawing/2014/main" id="{B522B379-9FA9-BD16-AE71-D109BE7BC877}"/>
+              </a:ext>
+            </a:extLst>
+          </p:cNvPr>
+          <p:cNvSpPr/>
+          <p:nvPr/>
+        </p:nvSpPr>
+        <p:spPr>
+          <a:xfrm>
+            <a:off x="2017742" y="2667525"/>
+            <a:ext cx="884974" cy="1045151"/>
+          </a:xfrm>
+          <a:custGeom>
+            <a:avLst/>
+            <a:gdLst>
+              <a:gd name="connsiteX0" fmla="*/ 239134 w 474863"/>
+              <a:gd name="connsiteY0" fmla="*/ 0 h 560811"/>
+              <a:gd name="connsiteX1" fmla="*/ 474863 w 474863"/>
+              <a:gd name="connsiteY1" fmla="*/ 552827 h 560811"/>
+              <a:gd name="connsiteX2" fmla="*/ 457404 w 474863"/>
+              <a:gd name="connsiteY2" fmla="*/ 542756 h 560811"/>
+              <a:gd name="connsiteX3" fmla="*/ 244352 w 474863"/>
+              <a:gd name="connsiteY3" fmla="*/ 497045 h 560811"/>
+              <a:gd name="connsiteX4" fmla="*/ 31300 w 474863"/>
+              <a:gd name="connsiteY4" fmla="*/ 542756 h 560811"/>
+              <a:gd name="connsiteX5" fmla="*/ 0 w 474863"/>
+              <a:gd name="connsiteY5" fmla="*/ 560811 h 560811"/>
+            </a:gdLst>
+            <a:ahLst/>
+            <a:cxnLst>
+              <a:cxn ang="0">
+                <a:pos x="connsiteX0" y="connsiteY0"/>
+              </a:cxn>
+              <a:cxn ang="0">
+                <a:pos x="connsiteX1" y="connsiteY1"/>
+              </a:cxn>
+              <a:cxn ang="0">
+                <a:pos x="connsiteX2" y="connsiteY2"/>
+              </a:cxn>
+              <a:cxn ang="0">
+                <a:pos x="connsiteX3" y="connsiteY3"/>
+              </a:cxn>
+              <a:cxn ang="0">
+                <a:pos x="connsiteX4" y="connsiteY4"/>
+              </a:cxn>
+              <a:cxn ang="0">
+                <a:pos x="connsiteX5" y="connsiteY5"/>
+              </a:cxn>
+            </a:cxnLst>
+            <a:rect l="l" t="t" r="r" b="b"/>
+            <a:pathLst>
+              <a:path w="474863" h="560811">
+                <a:moveTo>
+                  <a:pt x="239134" y="0"/>
+                </a:moveTo>
+                <a:lnTo>
+                  <a:pt x="474863" y="552827"/>
+                </a:lnTo>
+                <a:lnTo>
+                  <a:pt x="457404" y="542756"/>
+                </a:lnTo>
+                <a:cubicBezTo>
+                  <a:pt x="391920" y="513322"/>
+                  <a:pt x="319925" y="497045"/>
+                  <a:pt x="244352" y="497045"/>
+                </a:cubicBezTo>
+                <a:cubicBezTo>
+                  <a:pt x="168779" y="497045"/>
+                  <a:pt x="96784" y="513322"/>
+                  <a:pt x="31300" y="542756"/>
+                </a:cubicBezTo>
+                <a:lnTo>
+                  <a:pt x="0" y="560811"/>
+                </a:lnTo>
+                <a:close/>
+              </a:path>
+            </a:pathLst>
+          </a:custGeom>
+          <a:ln w="101600">
+            <a:solidFill>
+              <a:schemeClr val="bg1"/>
+            </a:solidFill>
+          </a:ln>
+        </p:spPr>
+        <p:style>
+          <a:lnRef idx="2">
+            <a:schemeClr val="accent1">
+              <a:shade val="15000"/>
+            </a:schemeClr>
+          </a:lnRef>
+          <a:fillRef idx="1">
+            <a:schemeClr val="accent1"/>
+          </a:fillRef>
+          <a:effectRef idx="0">
+            <a:schemeClr val="accent1"/>
+          </a:effectRef>
+          <a:fontRef idx="minor">
+            <a:schemeClr val="lt1"/>
+          </a:fontRef>
+        </p:style>
+        <p:txBody>
+          <a:bodyPr wrap="square" rtlCol="0" anchor="ctr">
+            <a:noAutofit/>
+          </a:bodyPr>
+          <a:lstStyle/>
+          <a:p>
+            <a:pPr algn="ctr"/>
+            <a:endParaRPr lang="es-ES"/>
+          </a:p>
+        </p:txBody>
+      </p:sp>
     </p:spTree>
     <p:extLst>
       <p:ext uri="{BB962C8B-B14F-4D97-AF65-F5344CB8AC3E}">

</xml_diff>